<commit_message>
Updated Head slide - Sketched out what I want to cover.
</commit_message>
<xml_diff>
--- a/Introduction to Html.pptx
+++ b/Introduction to Html.pptx
@@ -21,18 +21,18 @@
     <p:sldId id="283" r:id="rId12"/>
     <p:sldId id="286" r:id="rId13"/>
     <p:sldId id="265" r:id="rId14"/>
-    <p:sldId id="267" r:id="rId15"/>
-    <p:sldId id="289" r:id="rId16"/>
-    <p:sldId id="269" r:id="rId17"/>
-    <p:sldId id="281" r:id="rId18"/>
-    <p:sldId id="279" r:id="rId19"/>
-    <p:sldId id="280" r:id="rId20"/>
-    <p:sldId id="291" r:id="rId21"/>
-    <p:sldId id="282" r:id="rId22"/>
-    <p:sldId id="284" r:id="rId23"/>
-    <p:sldId id="287" r:id="rId24"/>
-    <p:sldId id="288" r:id="rId25"/>
-    <p:sldId id="290" r:id="rId26"/>
+    <p:sldId id="289" r:id="rId15"/>
+    <p:sldId id="267" r:id="rId16"/>
+    <p:sldId id="290" r:id="rId17"/>
+    <p:sldId id="269" r:id="rId18"/>
+    <p:sldId id="281" r:id="rId19"/>
+    <p:sldId id="279" r:id="rId20"/>
+    <p:sldId id="280" r:id="rId21"/>
+    <p:sldId id="291" r:id="rId22"/>
+    <p:sldId id="282" r:id="rId23"/>
+    <p:sldId id="284" r:id="rId24"/>
+    <p:sldId id="287" r:id="rId25"/>
+    <p:sldId id="288" r:id="rId26"/>
     <p:sldId id="271" r:id="rId27"/>
     <p:sldId id="274" r:id="rId28"/>
     <p:sldId id="276" r:id="rId29"/>
@@ -219,7 +219,7 @@
           <a:p>
             <a:fld id="{9263563D-A8BD-4420-B279-339C0FB6A493}" type="datetimeFigureOut">
               <a:rPr lang="en-GB" smtClean="0"/>
-              <a:t>29/07/2014</a:t>
+              <a:t>30/07/2014</a:t>
             </a:fld>
             <a:endParaRPr lang="en-GB"/>
           </a:p>
@@ -625,7 +625,11 @@
           <a:p>
             <a:r>
               <a:rPr lang="en-GB" dirty="0" smtClean="0"/>
-              <a:t>Use </a:t>
+              <a:t>Others – but use</a:t>
+            </a:r>
+            <a:r>
+              <a:rPr lang="en-GB" baseline="0" dirty="0" smtClean="0"/>
+              <a:t> these.</a:t>
             </a:r>
             <a:endParaRPr lang="en-GB" dirty="0"/>
           </a:p>
@@ -657,7 +661,7 @@
     </p:spTree>
     <p:extLst>
       <p:ext uri="{BB962C8B-B14F-4D97-AF65-F5344CB8AC3E}">
-        <p14:creationId xmlns:p14="http://schemas.microsoft.com/office/powerpoint/2010/main" val="1183163251"/>
+        <p14:creationId xmlns:p14="http://schemas.microsoft.com/office/powerpoint/2010/main" val="2622262262"/>
       </p:ext>
     </p:extLst>
   </p:cSld>
@@ -740,7 +744,7 @@
           <a:p>
             <a:fld id="{8E8E9A94-0572-4FBE-A9E5-D0D847F07028}" type="slidenum">
               <a:rPr lang="en-GB" smtClean="0"/>
-              <a:t>16</a:t>
+              <a:t>17</a:t>
             </a:fld>
             <a:endParaRPr lang="en-GB"/>
           </a:p>
@@ -824,7 +828,7 @@
           <a:p>
             <a:fld id="{8E8E9A94-0572-4FBE-A9E5-D0D847F07028}" type="slidenum">
               <a:rPr lang="en-GB" smtClean="0"/>
-              <a:t>21</a:t>
+              <a:t>22</a:t>
             </a:fld>
             <a:endParaRPr lang="en-GB"/>
           </a:p>
@@ -1558,11 +1562,7 @@
           <a:p>
             <a:r>
               <a:rPr lang="en-GB" dirty="0" smtClean="0"/>
-              <a:t>Others – but use</a:t>
-            </a:r>
-            <a:r>
-              <a:rPr lang="en-GB" baseline="0" dirty="0" smtClean="0"/>
-              <a:t> these.</a:t>
+              <a:t>Use </a:t>
             </a:r>
             <a:endParaRPr lang="en-GB" dirty="0"/>
           </a:p>
@@ -1594,7 +1594,7 @@
     </p:spTree>
     <p:extLst>
       <p:ext uri="{BB962C8B-B14F-4D97-AF65-F5344CB8AC3E}">
-        <p14:creationId xmlns:p14="http://schemas.microsoft.com/office/powerpoint/2010/main" val="2622262262"/>
+        <p14:creationId xmlns:p14="http://schemas.microsoft.com/office/powerpoint/2010/main" val="1183163251"/>
       </p:ext>
     </p:extLst>
   </p:cSld>
@@ -4689,7 +4689,6 @@
               <a:rPr lang="en-GB" dirty="0"/>
               <a:t>Wasn’t that all just layout?</a:t>
             </a:r>
-            <a:endParaRPr lang="en-GB" dirty="0"/>
           </a:p>
         </p:txBody>
       </p:sp>
@@ -4720,13 +4719,8 @@
             </a:r>
             <a:r>
               <a:rPr lang="en-GB" dirty="0" smtClean="0"/>
-              <a:t>From the heading; </a:t>
-            </a:r>
-            <a:r>
-              <a:rPr lang="en-GB" dirty="0" smtClean="0"/>
-              <a:t>The navigation is in the header.</a:t>
-            </a:r>
-            <a:endParaRPr lang="en-GB" dirty="0" smtClean="0"/>
+              <a:t>From the heading; The navigation is in the header.</a:t>
+            </a:r>
           </a:p>
           <a:p>
             <a:r>
@@ -4737,11 +4731,7 @@
           <a:p>
             <a:r>
               <a:rPr lang="en-GB" dirty="0" smtClean="0"/>
-              <a:t>Layout is achieved by formatting the blocks e.g. </a:t>
-            </a:r>
-            <a:r>
-              <a:rPr lang="en-GB" dirty="0" smtClean="0"/>
-              <a:t>width, position etc. How we achieve this is varied and will be covered later. Take a look at  </a:t>
+              <a:t>Layout is achieved by formatting the blocks e.g. width, position etc. How we achieve this is varied and will be covered later. Take a look at  </a:t>
             </a:r>
             <a:r>
               <a:rPr lang="en-GB" dirty="0">
@@ -4767,7 +4757,6 @@
               <a:rPr lang="en-GB" dirty="0" smtClean="0"/>
               <a:t> differs!</a:t>
             </a:r>
-            <a:endParaRPr lang="en-GB" dirty="0" smtClean="0"/>
           </a:p>
           <a:p>
             <a:endParaRPr lang="en-GB" dirty="0"/>
@@ -5154,10 +5143,9 @@
           <a:lstStyle/>
           <a:p>
             <a:r>
-              <a:rPr lang="en-GB" dirty="0" smtClean="0"/>
-              <a:t>Basic Text Formatting</a:t>
-            </a:r>
-            <a:endParaRPr lang="en-GB" dirty="0"/>
+              <a:rPr lang="en-GB" dirty="0"/>
+              <a:t>Symbols &amp; Entities</a:t>
+            </a:r>
           </a:p>
         </p:txBody>
       </p:sp>
@@ -5176,40 +5164,14 @@
           <a:bodyPr/>
           <a:lstStyle/>
           <a:p>
-            <a:r>
-              <a:rPr lang="en-GB" dirty="0" smtClean="0"/>
-              <a:t>Bold</a:t>
-            </a:r>
-          </a:p>
-          <a:p>
-            <a:r>
-              <a:rPr lang="en-GB" dirty="0" smtClean="0"/>
-              <a:t>Italic</a:t>
-            </a:r>
-          </a:p>
-          <a:p>
-            <a:r>
-              <a:rPr lang="en-GB" dirty="0" smtClean="0"/>
-              <a:t>Super &amp; </a:t>
-            </a:r>
-            <a:r>
-              <a:rPr lang="en-GB" dirty="0" err="1" smtClean="0"/>
-              <a:t>SubScripts</a:t>
-            </a:r>
-            <a:endParaRPr lang="en-GB" dirty="0" smtClean="0"/>
-          </a:p>
-          <a:p>
-            <a:r>
-              <a:rPr lang="en-GB" dirty="0" smtClean="0"/>
-              <a:t>Small</a:t>
-            </a:r>
+            <a:endParaRPr lang="en-GB"/>
           </a:p>
         </p:txBody>
       </p:sp>
     </p:spTree>
     <p:extLst>
       <p:ext uri="{BB962C8B-B14F-4D97-AF65-F5344CB8AC3E}">
-        <p14:creationId xmlns:p14="http://schemas.microsoft.com/office/powerpoint/2010/main" val="3650326798"/>
+        <p14:creationId xmlns:p14="http://schemas.microsoft.com/office/powerpoint/2010/main" val="2946799117"/>
       </p:ext>
     </p:extLst>
   </p:cSld>
@@ -5259,9 +5221,10 @@
           <a:lstStyle/>
           <a:p>
             <a:r>
-              <a:rPr lang="en-GB" dirty="0"/>
-              <a:t>Symbols &amp; Entities</a:t>
-            </a:r>
+              <a:rPr lang="en-GB" dirty="0" smtClean="0"/>
+              <a:t>Basic Text Formatting</a:t>
+            </a:r>
+            <a:endParaRPr lang="en-GB" dirty="0"/>
           </a:p>
         </p:txBody>
       </p:sp>
@@ -5280,14 +5243,40 @@
           <a:bodyPr/>
           <a:lstStyle/>
           <a:p>
-            <a:endParaRPr lang="en-GB"/>
+            <a:r>
+              <a:rPr lang="en-GB" dirty="0" smtClean="0"/>
+              <a:t>Bold</a:t>
+            </a:r>
+          </a:p>
+          <a:p>
+            <a:r>
+              <a:rPr lang="en-GB" dirty="0" smtClean="0"/>
+              <a:t>Italic</a:t>
+            </a:r>
+          </a:p>
+          <a:p>
+            <a:r>
+              <a:rPr lang="en-GB" dirty="0" smtClean="0"/>
+              <a:t>Super &amp; </a:t>
+            </a:r>
+            <a:r>
+              <a:rPr lang="en-GB" dirty="0" err="1" smtClean="0"/>
+              <a:t>SubScripts</a:t>
+            </a:r>
+            <a:endParaRPr lang="en-GB" dirty="0" smtClean="0"/>
+          </a:p>
+          <a:p>
+            <a:r>
+              <a:rPr lang="en-GB" dirty="0" smtClean="0"/>
+              <a:t>Small</a:t>
+            </a:r>
           </a:p>
         </p:txBody>
       </p:sp>
     </p:spTree>
     <p:extLst>
       <p:ext uri="{BB962C8B-B14F-4D97-AF65-F5344CB8AC3E}">
-        <p14:creationId xmlns:p14="http://schemas.microsoft.com/office/powerpoint/2010/main" val="2946799117"/>
+        <p14:creationId xmlns:p14="http://schemas.microsoft.com/office/powerpoint/2010/main" val="3650326798"/>
       </p:ext>
     </p:extLst>
   </p:cSld>
@@ -5338,7 +5327,7 @@
           <a:p>
             <a:r>
               <a:rPr lang="en-GB" dirty="0" smtClean="0"/>
-              <a:t>Page Structure Tags</a:t>
+              <a:t>Html Blocks</a:t>
             </a:r>
             <a:endParaRPr lang="en-GB" dirty="0"/>
           </a:p>
@@ -5359,52 +5348,14 @@
           <a:bodyPr/>
           <a:lstStyle/>
           <a:p>
-            <a:r>
-              <a:rPr lang="en-GB" dirty="0" smtClean="0"/>
-              <a:t>Header</a:t>
-            </a:r>
-          </a:p>
-          <a:p>
-            <a:r>
-              <a:rPr lang="en-GB" dirty="0" smtClean="0"/>
-              <a:t>Footer</a:t>
-            </a:r>
-          </a:p>
-          <a:p>
-            <a:r>
-              <a:rPr lang="en-GB" dirty="0" smtClean="0"/>
-              <a:t>Aside</a:t>
-            </a:r>
-          </a:p>
-          <a:p>
-            <a:r>
-              <a:rPr lang="en-GB" dirty="0" smtClean="0"/>
-              <a:t>Section</a:t>
-            </a:r>
-          </a:p>
-          <a:p>
-            <a:r>
-              <a:rPr lang="en-GB" dirty="0" err="1" smtClean="0"/>
-              <a:t>Nav</a:t>
-            </a:r>
-            <a:endParaRPr lang="en-GB" dirty="0" smtClean="0"/>
-          </a:p>
-          <a:p>
-            <a:r>
-              <a:rPr lang="en-GB" dirty="0" err="1" smtClean="0"/>
-              <a:t>Divs</a:t>
-            </a:r>
-            <a:r>
-              <a:rPr lang="en-GB" dirty="0"/>
-              <a:t> </a:t>
-            </a:r>
+            <a:endParaRPr lang="en-GB" dirty="0"/>
           </a:p>
         </p:txBody>
       </p:sp>
     </p:spTree>
     <p:extLst>
       <p:ext uri="{BB962C8B-B14F-4D97-AF65-F5344CB8AC3E}">
-        <p14:creationId xmlns:p14="http://schemas.microsoft.com/office/powerpoint/2010/main" val="2380236578"/>
+        <p14:creationId xmlns:p14="http://schemas.microsoft.com/office/powerpoint/2010/main" val="2461843922"/>
       </p:ext>
     </p:extLst>
   </p:cSld>
@@ -5454,9 +5405,10 @@
           <a:lstStyle/>
           <a:p>
             <a:r>
-              <a:rPr lang="en-GB" dirty="0"/>
-              <a:t>Images</a:t>
-            </a:r>
+              <a:rPr lang="en-GB" dirty="0" smtClean="0"/>
+              <a:t>Page Structure Tags</a:t>
+            </a:r>
+            <a:endParaRPr lang="en-GB" dirty="0"/>
           </a:p>
         </p:txBody>
       </p:sp>
@@ -5475,72 +5427,52 @@
           <a:bodyPr/>
           <a:lstStyle/>
           <a:p>
-            <a:pPr marL="274320" lvl="1" indent="-274320">
-              <a:buClr>
-                <a:schemeClr val="tx2"/>
-              </a:buClr>
-              <a:buSzPct val="95000"/>
-            </a:pPr>
+            <a:r>
+              <a:rPr lang="en-GB" dirty="0" smtClean="0"/>
+              <a:t>Header</a:t>
+            </a:r>
+          </a:p>
+          <a:p>
+            <a:r>
+              <a:rPr lang="en-GB" dirty="0" smtClean="0"/>
+              <a:t>Footer</a:t>
+            </a:r>
+          </a:p>
+          <a:p>
+            <a:r>
+              <a:rPr lang="en-GB" dirty="0" smtClean="0"/>
+              <a:t>Aside</a:t>
+            </a:r>
+          </a:p>
+          <a:p>
+            <a:r>
+              <a:rPr lang="en-GB" dirty="0" smtClean="0"/>
+              <a:t>Section</a:t>
+            </a:r>
+          </a:p>
+          <a:p>
             <a:r>
               <a:rPr lang="en-GB" dirty="0" err="1" smtClean="0"/>
-              <a:t>Src</a:t>
+              <a:t>Nav</a:t>
             </a:r>
             <a:endParaRPr lang="en-GB" dirty="0" smtClean="0"/>
           </a:p>
           <a:p>
-            <a:pPr marL="274320" lvl="1" indent="-274320">
-              <a:buClr>
-                <a:schemeClr val="tx2"/>
-              </a:buClr>
-              <a:buSzPct val="95000"/>
-            </a:pPr>
-            <a:r>
-              <a:rPr lang="en-GB" dirty="0" smtClean="0"/>
-              <a:t>Alt </a:t>
-            </a:r>
-          </a:p>
-          <a:p>
-            <a:pPr marL="274320" lvl="1" indent="-274320">
-              <a:buClr>
-                <a:schemeClr val="tx2"/>
-              </a:buClr>
-              <a:buSzPct val="95000"/>
-            </a:pPr>
-            <a:r>
-              <a:rPr lang="en-GB" dirty="0" smtClean="0"/>
-              <a:t>height </a:t>
+            <a:r>
+              <a:rPr lang="en-GB" dirty="0" err="1" smtClean="0"/>
+              <a:t>Divs</a:t>
             </a:r>
             <a:r>
               <a:rPr lang="en-GB" dirty="0"/>
-              <a:t>width</a:t>
-            </a:r>
-            <a:r>
-              <a:rPr lang="en-GB" dirty="0" smtClean="0"/>
-              <a:t>.</a:t>
-            </a:r>
-          </a:p>
-          <a:p>
-            <a:pPr marL="274320" lvl="1" indent="-274320">
-              <a:buClr>
-                <a:schemeClr val="tx2"/>
-              </a:buClr>
-              <a:buSzPct val="95000"/>
-            </a:pPr>
-            <a:r>
-              <a:rPr lang="en-GB" dirty="0" smtClean="0"/>
-              <a:t>Warning about use – large &amp; multiple images = slow download times.</a:t>
-            </a:r>
-            <a:endParaRPr lang="en-GB" dirty="0"/>
-          </a:p>
-          <a:p>
-            <a:endParaRPr lang="en-GB" dirty="0"/>
+              <a:t> </a:t>
+            </a:r>
           </a:p>
         </p:txBody>
       </p:sp>
     </p:spTree>
     <p:extLst>
       <p:ext uri="{BB962C8B-B14F-4D97-AF65-F5344CB8AC3E}">
-        <p14:creationId xmlns:p14="http://schemas.microsoft.com/office/powerpoint/2010/main" val="2673695592"/>
+        <p14:creationId xmlns:p14="http://schemas.microsoft.com/office/powerpoint/2010/main" val="2380236578"/>
       </p:ext>
     </p:extLst>
   </p:cSld>
@@ -5590,10 +5522,9 @@
           <a:lstStyle/>
           <a:p>
             <a:r>
-              <a:rPr lang="en-GB" dirty="0" smtClean="0"/>
-              <a:t>Comments</a:t>
-            </a:r>
-            <a:endParaRPr lang="en-GB" dirty="0"/>
+              <a:rPr lang="en-GB" dirty="0"/>
+              <a:t>Images</a:t>
+            </a:r>
           </a:p>
         </p:txBody>
       </p:sp>
@@ -5612,22 +5543,64 @@
           <a:bodyPr/>
           <a:lstStyle/>
           <a:p>
+            <a:pPr marL="274320" lvl="1" indent="-274320">
+              <a:buClr>
+                <a:schemeClr val="tx2"/>
+              </a:buClr>
+              <a:buSzPct val="95000"/>
+            </a:pPr>
+            <a:r>
+              <a:rPr lang="en-GB" dirty="0" err="1" smtClean="0"/>
+              <a:t>Src</a:t>
+            </a:r>
+            <a:endParaRPr lang="en-GB" dirty="0" smtClean="0"/>
+          </a:p>
+          <a:p>
+            <a:pPr marL="274320" lvl="1" indent="-274320">
+              <a:buClr>
+                <a:schemeClr val="tx2"/>
+              </a:buClr>
+              <a:buSzPct val="95000"/>
+            </a:pPr>
             <a:r>
               <a:rPr lang="en-GB" dirty="0" smtClean="0"/>
-              <a:t>How to add</a:t>
-            </a:r>
-          </a:p>
-          <a:p>
+              <a:t>Alt </a:t>
+            </a:r>
+          </a:p>
+          <a:p>
+            <a:pPr marL="274320" lvl="1" indent="-274320">
+              <a:buClr>
+                <a:schemeClr val="tx2"/>
+              </a:buClr>
+              <a:buSzPct val="95000"/>
+            </a:pPr>
             <a:r>
               <a:rPr lang="en-GB" dirty="0" smtClean="0"/>
-              <a:t>Be careful! </a:t>
-            </a:r>
-          </a:p>
-          <a:p>
+              <a:t>height </a:t>
+            </a:r>
+            <a:r>
+              <a:rPr lang="en-GB" dirty="0"/>
+              <a:t>width</a:t>
+            </a:r>
             <a:r>
               <a:rPr lang="en-GB" dirty="0" smtClean="0"/>
-              <a:t>When using main solution don’t need!</a:t>
-            </a:r>
+              <a:t>.</a:t>
+            </a:r>
+          </a:p>
+          <a:p>
+            <a:pPr marL="274320" lvl="1" indent="-274320">
+              <a:buClr>
+                <a:schemeClr val="tx2"/>
+              </a:buClr>
+              <a:buSzPct val="95000"/>
+            </a:pPr>
+            <a:r>
+              <a:rPr lang="en-GB" dirty="0" smtClean="0"/>
+              <a:t>Warning about use – large &amp; multiple images = slow download times.</a:t>
+            </a:r>
+            <a:endParaRPr lang="en-GB" dirty="0"/>
+          </a:p>
+          <a:p>
             <a:endParaRPr lang="en-GB" dirty="0"/>
           </a:p>
         </p:txBody>
@@ -5635,7 +5608,7 @@
     </p:spTree>
     <p:extLst>
       <p:ext uri="{BB962C8B-B14F-4D97-AF65-F5344CB8AC3E}">
-        <p14:creationId xmlns:p14="http://schemas.microsoft.com/office/powerpoint/2010/main" val="3862359581"/>
+        <p14:creationId xmlns:p14="http://schemas.microsoft.com/office/powerpoint/2010/main" val="2673695592"/>
       </p:ext>
     </p:extLst>
   </p:cSld>
@@ -5686,7 +5659,7 @@
           <a:p>
             <a:r>
               <a:rPr lang="en-GB" dirty="0" smtClean="0"/>
-              <a:t>Links</a:t>
+              <a:t>Comments</a:t>
             </a:r>
             <a:endParaRPr lang="en-GB" dirty="0"/>
           </a:p>
@@ -5708,30 +5681,20 @@
           <a:lstStyle/>
           <a:p>
             <a:r>
-              <a:rPr lang="en-GB" dirty="0"/>
-              <a:t>Links</a:t>
-            </a:r>
-          </a:p>
-          <a:p>
-            <a:pPr lvl="1"/>
-            <a:r>
               <a:rPr lang="en-GB" dirty="0" smtClean="0"/>
-              <a:t>Content – Text Image</a:t>
-            </a:r>
-          </a:p>
-          <a:p>
-            <a:pPr lvl="1"/>
-            <a:r>
-              <a:rPr lang="en-GB" dirty="0" err="1" smtClean="0"/>
-              <a:t>Href</a:t>
-            </a:r>
-            <a:endParaRPr lang="en-GB" dirty="0" smtClean="0"/>
-          </a:p>
-          <a:p>
-            <a:pPr lvl="1"/>
+              <a:t>How to add</a:t>
+            </a:r>
+          </a:p>
+          <a:p>
             <a:r>
               <a:rPr lang="en-GB" dirty="0" smtClean="0"/>
-              <a:t>Target</a:t>
+              <a:t>Be careful! </a:t>
+            </a:r>
+          </a:p>
+          <a:p>
+            <a:r>
+              <a:rPr lang="en-GB" dirty="0" smtClean="0"/>
+              <a:t>When using main solution don’t need!</a:t>
             </a:r>
             <a:endParaRPr lang="en-GB" dirty="0"/>
           </a:p>
@@ -5740,7 +5703,7 @@
     </p:spTree>
     <p:extLst>
       <p:ext uri="{BB962C8B-B14F-4D97-AF65-F5344CB8AC3E}">
-        <p14:creationId xmlns:p14="http://schemas.microsoft.com/office/powerpoint/2010/main" val="560274725"/>
+        <p14:creationId xmlns:p14="http://schemas.microsoft.com/office/powerpoint/2010/main" val="3862359581"/>
       </p:ext>
     </p:extLst>
   </p:cSld>
@@ -5938,10 +5901,10 @@
           <a:lstStyle/>
           <a:p>
             <a:r>
-              <a:rPr lang="en-GB" smtClean="0"/>
-              <a:t>IFrame</a:t>
-            </a:r>
-            <a:endParaRPr lang="en-GB"/>
+              <a:rPr lang="en-GB" dirty="0" smtClean="0"/>
+              <a:t>Links</a:t>
+            </a:r>
+            <a:endParaRPr lang="en-GB" dirty="0"/>
           </a:p>
         </p:txBody>
       </p:sp>
@@ -5960,14 +5923,40 @@
           <a:bodyPr/>
           <a:lstStyle/>
           <a:p>
-            <a:endParaRPr lang="en-GB"/>
+            <a:r>
+              <a:rPr lang="en-GB" dirty="0"/>
+              <a:t>Links</a:t>
+            </a:r>
+          </a:p>
+          <a:p>
+            <a:pPr lvl="1"/>
+            <a:r>
+              <a:rPr lang="en-GB" dirty="0" smtClean="0"/>
+              <a:t>Content – Text Image</a:t>
+            </a:r>
+          </a:p>
+          <a:p>
+            <a:pPr lvl="1"/>
+            <a:r>
+              <a:rPr lang="en-GB" dirty="0" err="1" smtClean="0"/>
+              <a:t>Href</a:t>
+            </a:r>
+            <a:endParaRPr lang="en-GB" dirty="0" smtClean="0"/>
+          </a:p>
+          <a:p>
+            <a:pPr lvl="1"/>
+            <a:r>
+              <a:rPr lang="en-GB" dirty="0" smtClean="0"/>
+              <a:t>Target</a:t>
+            </a:r>
+            <a:endParaRPr lang="en-GB" dirty="0"/>
           </a:p>
         </p:txBody>
       </p:sp>
     </p:spTree>
     <p:extLst>
       <p:ext uri="{BB962C8B-B14F-4D97-AF65-F5344CB8AC3E}">
-        <p14:creationId xmlns:p14="http://schemas.microsoft.com/office/powerpoint/2010/main" val="1242559944"/>
+        <p14:creationId xmlns:p14="http://schemas.microsoft.com/office/powerpoint/2010/main" val="560274725"/>
       </p:ext>
     </p:extLst>
   </p:cSld>
@@ -6017,10 +6006,10 @@
           <a:lstStyle/>
           <a:p>
             <a:r>
-              <a:rPr lang="en-GB" dirty="0" smtClean="0"/>
-              <a:t>Common Attributes</a:t>
-            </a:r>
-            <a:endParaRPr lang="en-GB" dirty="0"/>
+              <a:rPr lang="en-GB" smtClean="0"/>
+              <a:t>IFrame</a:t>
+            </a:r>
+            <a:endParaRPr lang="en-GB"/>
           </a:p>
         </p:txBody>
       </p:sp>
@@ -6039,54 +6028,14 @@
           <a:bodyPr/>
           <a:lstStyle/>
           <a:p>
-            <a:r>
-              <a:rPr lang="en-GB" dirty="0" smtClean="0"/>
-              <a:t>Id</a:t>
-            </a:r>
-          </a:p>
-          <a:p>
-            <a:r>
-              <a:rPr lang="en-GB" dirty="0" smtClean="0"/>
-              <a:t>Class</a:t>
-            </a:r>
-          </a:p>
-          <a:p>
-            <a:r>
-              <a:rPr lang="en-GB" dirty="0" smtClean="0"/>
-              <a:t>Inline style – avoid</a:t>
-            </a:r>
-          </a:p>
-          <a:p>
-            <a:r>
-              <a:rPr lang="en-GB" dirty="0" smtClean="0"/>
-              <a:t>Title</a:t>
-            </a:r>
-          </a:p>
-          <a:p>
-            <a:r>
-              <a:rPr lang="en-GB" dirty="0" smtClean="0"/>
-              <a:t>Commonly used to identify styles with </a:t>
-            </a:r>
-            <a:r>
-              <a:rPr lang="en-GB" dirty="0" err="1" smtClean="0"/>
-              <a:t>css</a:t>
-            </a:r>
-            <a:r>
-              <a:rPr lang="en-GB" dirty="0" smtClean="0"/>
-              <a:t> and </a:t>
-            </a:r>
-            <a:r>
-              <a:rPr lang="en-GB" dirty="0" err="1" smtClean="0"/>
-              <a:t>javascript</a:t>
-            </a:r>
-            <a:endParaRPr lang="en-GB" dirty="0"/>
+            <a:endParaRPr lang="en-GB"/>
           </a:p>
         </p:txBody>
       </p:sp>
     </p:spTree>
     <p:extLst>
       <p:ext uri="{BB962C8B-B14F-4D97-AF65-F5344CB8AC3E}">
-        <p14:creationId xmlns:p14="http://schemas.microsoft.com/office/powerpoint/2010/main" val="2552764474"/>
+        <p14:creationId xmlns:p14="http://schemas.microsoft.com/office/powerpoint/2010/main" val="1242559944"/>
       </p:ext>
     </p:extLst>
   </p:cSld>
@@ -6137,7 +6086,7 @@
           <a:p>
             <a:r>
               <a:rPr lang="en-GB" dirty="0" smtClean="0"/>
-              <a:t>Head/Body Section</a:t>
+              <a:t>Common Attributes</a:t>
             </a:r>
             <a:endParaRPr lang="en-GB" dirty="0"/>
           </a:p>
@@ -6160,7 +6109,43 @@
           <a:p>
             <a:r>
               <a:rPr lang="en-GB" dirty="0" smtClean="0"/>
-              <a:t>Don’t confuse Head/Heading/Header – all different.</a:t>
+              <a:t>Id</a:t>
+            </a:r>
+          </a:p>
+          <a:p>
+            <a:r>
+              <a:rPr lang="en-GB" dirty="0" smtClean="0"/>
+              <a:t>Class</a:t>
+            </a:r>
+          </a:p>
+          <a:p>
+            <a:r>
+              <a:rPr lang="en-GB" dirty="0" smtClean="0"/>
+              <a:t>Inline style – avoid</a:t>
+            </a:r>
+          </a:p>
+          <a:p>
+            <a:r>
+              <a:rPr lang="en-GB" dirty="0" smtClean="0"/>
+              <a:t>Title</a:t>
+            </a:r>
+          </a:p>
+          <a:p>
+            <a:r>
+              <a:rPr lang="en-GB" dirty="0" smtClean="0"/>
+              <a:t>Commonly used to identify styles with </a:t>
+            </a:r>
+            <a:r>
+              <a:rPr lang="en-GB" dirty="0" err="1" smtClean="0"/>
+              <a:t>css</a:t>
+            </a:r>
+            <a:r>
+              <a:rPr lang="en-GB" dirty="0" smtClean="0"/>
+              <a:t> and </a:t>
+            </a:r>
+            <a:r>
+              <a:rPr lang="en-GB" dirty="0" err="1" smtClean="0"/>
+              <a:t>javascript</a:t>
             </a:r>
             <a:endParaRPr lang="en-GB" dirty="0"/>
           </a:p>
@@ -6169,7 +6154,7 @@
     </p:spTree>
     <p:extLst>
       <p:ext uri="{BB962C8B-B14F-4D97-AF65-F5344CB8AC3E}">
-        <p14:creationId xmlns:p14="http://schemas.microsoft.com/office/powerpoint/2010/main" val="3262453455"/>
+        <p14:creationId xmlns:p14="http://schemas.microsoft.com/office/powerpoint/2010/main" val="2552764474"/>
       </p:ext>
     </p:extLst>
   </p:cSld>
@@ -6219,9 +6204,10 @@
           <a:lstStyle/>
           <a:p>
             <a:r>
-              <a:rPr lang="en-GB" dirty="0"/>
-              <a:t>Tables</a:t>
-            </a:r>
+              <a:rPr lang="en-GB" dirty="0" smtClean="0"/>
+              <a:t>Head/Body Section</a:t>
+            </a:r>
+            <a:endParaRPr lang="en-GB" dirty="0"/>
           </a:p>
         </p:txBody>
       </p:sp>
@@ -6240,14 +6226,58 @@
           <a:bodyPr/>
           <a:lstStyle/>
           <a:p>
-            <a:endParaRPr lang="en-GB"/>
+            <a:r>
+              <a:rPr lang="en-GB" dirty="0" smtClean="0"/>
+              <a:t>Don’t confuse Head/Heading/Header – all different</a:t>
+            </a:r>
+            <a:r>
+              <a:rPr lang="en-GB" dirty="0" smtClean="0"/>
+              <a:t>.</a:t>
+            </a:r>
+          </a:p>
+          <a:p>
+            <a:r>
+              <a:rPr lang="en-GB" dirty="0" smtClean="0"/>
+              <a:t>Body is main displayed content</a:t>
+            </a:r>
+          </a:p>
+          <a:p>
+            <a:r>
+              <a:rPr lang="en-GB" dirty="0" smtClean="0"/>
+              <a:t>Head contains Info about doc</a:t>
+            </a:r>
+          </a:p>
+          <a:p>
+            <a:pPr lvl="1"/>
+            <a:r>
+              <a:rPr lang="en-GB" dirty="0" smtClean="0"/>
+              <a:t>Title</a:t>
+            </a:r>
+          </a:p>
+          <a:p>
+            <a:pPr lvl="1"/>
+            <a:r>
+              <a:rPr lang="en-GB" dirty="0" smtClean="0"/>
+              <a:t>Meta</a:t>
+            </a:r>
+          </a:p>
+          <a:p>
+            <a:pPr lvl="1"/>
+            <a:r>
+              <a:rPr lang="en-GB" dirty="0" err="1" smtClean="0"/>
+              <a:t>Stylesheets</a:t>
+            </a:r>
+            <a:r>
+              <a:rPr lang="en-GB" dirty="0" smtClean="0"/>
+              <a:t> &amp; Scripts – discuss later.</a:t>
+            </a:r>
           </a:p>
         </p:txBody>
       </p:sp>
     </p:spTree>
     <p:extLst>
       <p:ext uri="{BB962C8B-B14F-4D97-AF65-F5344CB8AC3E}">
-        <p14:creationId xmlns:p14="http://schemas.microsoft.com/office/powerpoint/2010/main" val="3881153990"/>
+        <p14:creationId xmlns:p14="http://schemas.microsoft.com/office/powerpoint/2010/main" val="3262453455"/>
       </p:ext>
     </p:extLst>
   </p:cSld>
@@ -6298,7 +6328,7 @@
           <a:p>
             <a:r>
               <a:rPr lang="en-GB" dirty="0"/>
-              <a:t>Lists</a:t>
+              <a:t>Tables</a:t>
             </a:r>
           </a:p>
         </p:txBody>
@@ -6325,7 +6355,7 @@
     </p:spTree>
     <p:extLst>
       <p:ext uri="{BB962C8B-B14F-4D97-AF65-F5344CB8AC3E}">
-        <p14:creationId xmlns:p14="http://schemas.microsoft.com/office/powerpoint/2010/main" val="3048917714"/>
+        <p14:creationId xmlns:p14="http://schemas.microsoft.com/office/powerpoint/2010/main" val="3881153990"/>
       </p:ext>
     </p:extLst>
   </p:cSld>
@@ -6375,10 +6405,9 @@
           <a:lstStyle/>
           <a:p>
             <a:r>
-              <a:rPr lang="en-GB" dirty="0" smtClean="0"/>
-              <a:t>Html Blocks</a:t>
-            </a:r>
-            <a:endParaRPr lang="en-GB" dirty="0"/>
+              <a:rPr lang="en-GB" dirty="0"/>
+              <a:t>Lists</a:t>
+            </a:r>
           </a:p>
         </p:txBody>
       </p:sp>
@@ -6397,14 +6426,14 @@
           <a:bodyPr/>
           <a:lstStyle/>
           <a:p>
-            <a:endParaRPr lang="en-GB" dirty="0"/>
+            <a:endParaRPr lang="en-GB"/>
           </a:p>
         </p:txBody>
       </p:sp>
     </p:spTree>
     <p:extLst>
       <p:ext uri="{BB962C8B-B14F-4D97-AF65-F5344CB8AC3E}">
-        <p14:creationId xmlns:p14="http://schemas.microsoft.com/office/powerpoint/2010/main" val="2461843922"/>
+        <p14:creationId xmlns:p14="http://schemas.microsoft.com/office/powerpoint/2010/main" val="3048917714"/>
       </p:ext>
     </p:extLst>
   </p:cSld>
@@ -7495,19 +7524,7 @@
               <a:rPr lang="en-GB" sz="1600" dirty="0" smtClean="0">
                 <a:latin typeface="Helvetica" panose="020B0604020202030204" pitchFamily="34" charset="0"/>
               </a:rPr>
-              <a:t>The Internet infrastructure passes the request on to the server </a:t>
-            </a:r>
-            <a:r>
-              <a:rPr lang="en-GB" sz="1600" dirty="0" smtClean="0">
-                <a:latin typeface="Helvetica" panose="020B0604020202030204" pitchFamily="34" charset="0"/>
-              </a:rPr>
-              <a:t>- if </a:t>
-            </a:r>
-            <a:r>
-              <a:rPr lang="en-GB" sz="1600" dirty="0" smtClean="0">
-                <a:latin typeface="Helvetica" panose="020B0604020202030204" pitchFamily="34" charset="0"/>
-              </a:rPr>
-              <a:t>it exists.</a:t>
+              <a:t>The Internet infrastructure passes the request on to the server - if it exists.</a:t>
             </a:r>
           </a:p>
           <a:p>
@@ -8874,15 +8891,7 @@
             </a:r>
             <a:r>
               <a:rPr lang="en-GB" dirty="0" smtClean="0"/>
-              <a:t> is just </a:t>
-            </a:r>
-            <a:r>
-              <a:rPr lang="en-GB" dirty="0" smtClean="0"/>
-              <a:t>text (they can be written in notepad), </a:t>
-            </a:r>
-            <a:r>
-              <a:rPr lang="en-GB" dirty="0" smtClean="0"/>
-              <a:t>but one that </a:t>
+              <a:t> is just text (they can be written in notepad), but one that </a:t>
             </a:r>
             <a:r>
               <a:rPr lang="en-GB" dirty="0"/>
@@ -8920,13 +8929,8 @@
             </a:r>
             <a:r>
               <a:rPr lang="en-GB" dirty="0" smtClean="0"/>
-              <a:t>Text that is capable of linking through to other text, both </a:t>
-            </a:r>
-            <a:r>
-              <a:rPr lang="en-GB" dirty="0" smtClean="0"/>
-              <a:t>internally or externally</a:t>
-            </a:r>
-            <a:endParaRPr lang="en-GB" dirty="0" smtClean="0"/>
+              <a:t>Text that is capable of linking through to other text, both internally or externally</a:t>
+            </a:r>
           </a:p>
           <a:p>
             <a:r>
@@ -8939,15 +8943,7 @@
             </a:r>
             <a:r>
               <a:rPr lang="en-GB" dirty="0" smtClean="0"/>
-              <a:t> A way of annotating text to </a:t>
-            </a:r>
-            <a:r>
-              <a:rPr lang="en-GB" dirty="0" smtClean="0"/>
-              <a:t>add </a:t>
-            </a:r>
-            <a:r>
-              <a:rPr lang="en-GB" dirty="0" smtClean="0"/>
-              <a:t>information such as structure and the hyperlinks themselves. HTML uses tags in angle brackets “</a:t>
+              <a:t> A way of annotating text to add information such as structure and the hyperlinks themselves. HTML uses tags in angle brackets “</a:t>
             </a:r>
             <a:r>
               <a:rPr lang="en-GB" dirty="0" smtClean="0">
@@ -13799,25 +13795,6 @@
               </a:rPr>
               <a:t>Hyperlink</a:t>
             </a:r>
-            <a:endParaRPr lang="en-GB" sz="1600" dirty="0" smtClean="0">
-              <a:ln w="18415" cmpd="sng">
-                <a:solidFill>
-                  <a:srgbClr val="FFFFFF"/>
-                </a:solidFill>
-                <a:prstDash val="solid"/>
-              </a:ln>
-              <a:solidFill>
-                <a:srgbClr val="FFFFFF"/>
-              </a:solidFill>
-              <a:effectLst>
-                <a:outerShdw blurRad="63500" dir="3600000" algn="tl" rotWithShape="0">
-                  <a:srgbClr val="000000">
-                    <a:alpha val="70000"/>
-                  </a:srgbClr>
-                </a:outerShdw>
-              </a:effectLst>
-              <a:latin typeface="Helvetica" panose="020B0604020202030204" pitchFamily="34" charset="0"/>
-            </a:endParaRPr>
           </a:p>
         </p:txBody>
       </p:sp>

</xml_diff>